<commit_message>
update final presentation with CRUD, aggregations and scaling strategies
</commit_message>
<xml_diff>
--- a/presentation/WASAText_T3_Final_Presentation.pptx
+++ b/presentation/WASAText_T3_Final_Presentation.pptx
@@ -14,6 +14,8 @@
     <p:sldId id="259" r:id="rId11"/>
     <p:sldId id="260" r:id="rId12"/>
     <p:sldId id="261" r:id="rId13"/>
+    <p:sldId id="262" r:id="rId14"/>
+    <p:sldId id="263" r:id="rId15"/>
   </p:sldIdLst>
   <p:sldSz cx="9144000" cy="6858000"/>
   <p:notesSz cx="6858000" cy="9144000"/>
@@ -3009,7 +3011,7 @@
         <p:spPr>
           <a:xfrm>
             <a:off x="457200" y="2580065"/>
-            <a:ext cx="8229601" cy="1143001"/>
+            <a:ext cx="8229600" cy="1143001"/>
           </a:xfrm>
           <a:prstGeom prst="rect">
             <a:avLst/>
@@ -3054,7 +3056,7 @@
         <p:spPr>
           <a:xfrm>
             <a:off x="457200" y="3681129"/>
-            <a:ext cx="8229601" cy="930816"/>
+            <a:ext cx="8229600" cy="930816"/>
           </a:xfrm>
           <a:prstGeom prst="rect">
             <a:avLst/>
@@ -3342,7 +3344,7 @@
         <p:spPr>
           <a:xfrm>
             <a:off x="2286000" y="3541278"/>
-            <a:ext cx="4572001" cy="2070223"/>
+            <a:ext cx="4572000" cy="2070223"/>
           </a:xfrm>
           <a:prstGeom prst="rect">
             <a:avLst/>
@@ -3360,8 +3362,8 @@
         </p:nvSpPr>
         <p:spPr>
           <a:xfrm>
-            <a:off x="457199" y="2603405"/>
-            <a:ext cx="8229601" cy="656804"/>
+            <a:off x="457200" y="2603405"/>
+            <a:ext cx="8229600" cy="656804"/>
           </a:xfrm>
           <a:prstGeom prst="rect">
             <a:avLst/>
@@ -3457,7 +3459,7 @@
           <a:p>
             <a:pPr/>
             <a:r>
-              <a:t>Benchmark Setup</a:t>
+              <a:t>CRUD Operations in MongoDB</a:t>
             </a:r>
           </a:p>
         </p:txBody>
@@ -3465,6 +3467,174 @@
       <p:sp>
         <p:nvSpPr>
           <p:cNvPr id="112" name="Content Placeholder 2"/>
+          <p:cNvSpPr txBox="1"/>
+          <p:nvPr>
+            <p:ph type="body" sz="half" idx="1"/>
+          </p:nvPr>
+        </p:nvSpPr>
+        <p:spPr>
+          <a:xfrm>
+            <a:off x="457200" y="1600200"/>
+            <a:ext cx="8229600" cy="1567480"/>
+          </a:xfrm>
+          <a:prstGeom prst="rect">
+            <a:avLst/>
+          </a:prstGeom>
+        </p:spPr>
+        <p:txBody>
+          <a:bodyPr/>
+          <a:lstStyle/>
+          <a:p>
+            <a:pPr marL="120315" indent="-120315">
+              <a:buFontTx/>
+              <a:defRPr sz="1200">
+                <a:latin typeface="Times New Roman"/>
+                <a:ea typeface="Times New Roman"/>
+                <a:cs typeface="Times New Roman"/>
+                <a:sym typeface="Times New Roman"/>
+              </a:defRPr>
+            </a:pPr>
+            <a:r>
+              <a:t>Create: insert conversations and messages</a:t>
+            </a:r>
+          </a:p>
+          <a:p>
+            <a:pPr marL="120315" indent="-120315">
+              <a:buFontTx/>
+              <a:defRPr sz="1200">
+                <a:latin typeface="Times New Roman"/>
+                <a:ea typeface="Times New Roman"/>
+                <a:cs typeface="Times New Roman"/>
+                <a:sym typeface="Times New Roman"/>
+              </a:defRPr>
+            </a:pPr>
+            <a:r>
+              <a:t>Read: inbox queries and message retrieval</a:t>
+            </a:r>
+          </a:p>
+          <a:p>
+            <a:pPr marL="120315" indent="-120315">
+              <a:buFontTx/>
+              <a:defRPr sz="1200">
+                <a:latin typeface="Times New Roman"/>
+                <a:ea typeface="Times New Roman"/>
+                <a:cs typeface="Times New Roman"/>
+                <a:sym typeface="Times New Roman"/>
+              </a:defRPr>
+            </a:pPr>
+            <a:r>
+              <a:t>Update: append messages and reactions</a:t>
+            </a:r>
+          </a:p>
+          <a:p>
+            <a:pPr marL="120315" indent="-120315">
+              <a:buFontTx/>
+              <a:defRPr sz="1200">
+                <a:latin typeface="Times New Roman"/>
+                <a:ea typeface="Times New Roman"/>
+                <a:cs typeface="Times New Roman"/>
+                <a:sym typeface="Times New Roman"/>
+              </a:defRPr>
+            </a:pPr>
+            <a:r>
+              <a:t>Delete: logical delete (soft delete)</a:t>
+            </a:r>
+          </a:p>
+          <a:p>
+            <a:pPr marL="120315" indent="-120315">
+              <a:buFontTx/>
+              <a:defRPr sz="1200">
+                <a:latin typeface="Times New Roman"/>
+                <a:ea typeface="Times New Roman"/>
+                <a:cs typeface="Times New Roman"/>
+                <a:sym typeface="Times New Roman"/>
+              </a:defRPr>
+            </a:pPr>
+            <a:r>
+              <a:rPr>
+                <a:latin typeface="Times Roman"/>
+                <a:ea typeface="Times Roman"/>
+                <a:cs typeface="Times Roman"/>
+                <a:sym typeface="Times Roman"/>
+              </a:rPr>
+              <a:t>Fully documented in </a:t>
+            </a:r>
+            <a:r>
+              <a:rPr>
+                <a:solidFill>
+                  <a:schemeClr val="accent1">
+                    <a:satOff val="-4409"/>
+                    <a:lumOff val="-10509"/>
+                  </a:schemeClr>
+                </a:solidFill>
+              </a:rPr>
+              <a:t>mongodb-study/docs/crud.md</a:t>
+            </a:r>
+          </a:p>
+        </p:txBody>
+      </p:sp>
+    </p:spTree>
+  </p:cSld>
+  <p:clrMapOvr>
+    <a:masterClrMapping/>
+  </p:clrMapOvr>
+  <p:transition xmlns:p14="http://schemas.microsoft.com/office/powerpoint/2010/main" spd="med" advClick="1"/>
+</p:sld>
+</file>
+
+<file path=ppt/slides/slide6.xml><?xml version="1.0" encoding="utf-8"?>
+<p:sld xmlns:a="http://schemas.openxmlformats.org/drawingml/2006/main" xmlns:r="http://schemas.openxmlformats.org/officeDocument/2006/relationships" xmlns:p="http://schemas.openxmlformats.org/presentationml/2006/main" xmlns:m="http://schemas.openxmlformats.org/officeDocument/2006/math" xmlns:a14="http://schemas.microsoft.com/office/drawing/2010/main" showMasterSp="1" showMasterPhAnim="1">
+  <p:cSld>
+    <p:spTree>
+      <p:nvGrpSpPr>
+        <p:cNvPr id="1" name=""/>
+        <p:cNvGrpSpPr/>
+        <p:nvPr/>
+      </p:nvGrpSpPr>
+      <p:grpSpPr>
+        <a:xfrm>
+          <a:off x="0" y="0"/>
+          <a:ext cx="0" cy="0"/>
+          <a:chOff x="0" y="0"/>
+          <a:chExt cx="0" cy="0"/>
+        </a:xfrm>
+      </p:grpSpPr>
+      <p:sp>
+        <p:nvSpPr>
+          <p:cNvPr id="114" name="Title 1"/>
+          <p:cNvSpPr txBox="1"/>
+          <p:nvPr>
+            <p:ph type="title"/>
+          </p:nvPr>
+        </p:nvSpPr>
+        <p:spPr>
+          <a:prstGeom prst="rect">
+            <a:avLst/>
+          </a:prstGeom>
+        </p:spPr>
+        <p:txBody>
+          <a:bodyPr/>
+          <a:lstStyle>
+            <a:lvl1pPr>
+              <a:defRPr b="1" sz="1800">
+                <a:latin typeface="Times New Roman"/>
+                <a:ea typeface="Times New Roman"/>
+                <a:cs typeface="Times New Roman"/>
+                <a:sym typeface="Times New Roman"/>
+              </a:defRPr>
+            </a:lvl1pPr>
+          </a:lstStyle>
+          <a:p>
+            <a:pPr/>
+            <a:r>
+              <a:t>Benchmark Setup</a:t>
+            </a:r>
+          </a:p>
+        </p:txBody>
+      </p:sp>
+      <p:sp>
+        <p:nvSpPr>
+          <p:cNvPr id="115" name="Content Placeholder 2"/>
           <p:cNvSpPr txBox="1"/>
           <p:nvPr>
             <p:ph type="body" sz="quarter" idx="1"/>
@@ -3504,14 +3674,14 @@
       </p:sp>
       <p:sp>
         <p:nvSpPr>
-          <p:cNvPr id="113" name="Title 1"/>
+          <p:cNvPr id="116" name="Title 1"/>
           <p:cNvSpPr txBox="1"/>
           <p:nvPr/>
         </p:nvSpPr>
         <p:spPr>
           <a:xfrm>
-            <a:off x="457200" y="2290807"/>
-            <a:ext cx="8229601" cy="1143001"/>
+            <a:off x="457200" y="2290808"/>
+            <a:ext cx="8229600" cy="1143001"/>
           </a:xfrm>
           <a:prstGeom prst="rect">
             <a:avLst/>
@@ -3549,14 +3719,14 @@
       </p:sp>
       <p:sp>
         <p:nvSpPr>
-          <p:cNvPr id="114" name="Content Placeholder 2"/>
+          <p:cNvPr id="117" name="Content Placeholder 2"/>
           <p:cNvSpPr txBox="1"/>
           <p:nvPr/>
         </p:nvSpPr>
         <p:spPr>
           <a:xfrm>
             <a:off x="457200" y="3525821"/>
-            <a:ext cx="8229601" cy="901506"/>
+            <a:ext cx="8229600" cy="901505"/>
           </a:xfrm>
           <a:prstGeom prst="rect">
             <a:avLst/>
@@ -3600,14 +3770,14 @@
       </p:sp>
       <p:sp>
         <p:nvSpPr>
-          <p:cNvPr id="115" name="Title 1"/>
+          <p:cNvPr id="118" name="Title 1"/>
           <p:cNvSpPr txBox="1"/>
           <p:nvPr/>
         </p:nvSpPr>
         <p:spPr>
           <a:xfrm>
-            <a:off x="457199" y="4306977"/>
-            <a:ext cx="8229601" cy="1143001"/>
+            <a:off x="457200" y="4306977"/>
+            <a:ext cx="8229600" cy="1143001"/>
           </a:xfrm>
           <a:prstGeom prst="rect">
             <a:avLst/>
@@ -3645,14 +3815,14 @@
       </p:sp>
       <p:sp>
         <p:nvSpPr>
-          <p:cNvPr id="116" name="Content Placeholder 2"/>
+          <p:cNvPr id="119" name="Content Placeholder 2"/>
           <p:cNvSpPr txBox="1"/>
           <p:nvPr/>
         </p:nvSpPr>
         <p:spPr>
           <a:xfrm>
-            <a:off x="457199" y="5632540"/>
-            <a:ext cx="8229601" cy="606412"/>
+            <a:off x="457200" y="5632539"/>
+            <a:ext cx="8229600" cy="606413"/>
           </a:xfrm>
           <a:prstGeom prst="rect">
             <a:avLst/>
@@ -3703,7 +3873,7 @@
 </p:sld>
 </file>
 
-<file path=ppt/slides/slide6.xml><?xml version="1.0" encoding="utf-8"?>
+<file path=ppt/slides/slide7.xml><?xml version="1.0" encoding="utf-8"?>
 <p:sld xmlns:a="http://schemas.openxmlformats.org/drawingml/2006/main" xmlns:r="http://schemas.openxmlformats.org/officeDocument/2006/relationships" xmlns:p="http://schemas.openxmlformats.org/presentationml/2006/main" xmlns:m="http://schemas.openxmlformats.org/officeDocument/2006/math" xmlns:a14="http://schemas.microsoft.com/office/drawing/2010/main" showMasterSp="1" showMasterPhAnim="1">
   <p:cSld>
     <p:spTree>
@@ -3722,7 +3892,7 @@
       </p:grpSpPr>
       <p:sp>
         <p:nvSpPr>
-          <p:cNvPr id="118" name="Title 1"/>
+          <p:cNvPr id="121" name="Title 1"/>
           <p:cNvSpPr txBox="1"/>
           <p:nvPr>
             <p:ph type="title"/>
@@ -3748,14 +3918,327 @@
           <a:p>
             <a:pPr/>
             <a:r>
-              <a:t>Conclusion</a:t>
+              <a:t>Aggregation Pipelines</a:t>
             </a:r>
           </a:p>
         </p:txBody>
       </p:sp>
       <p:sp>
         <p:nvSpPr>
-          <p:cNvPr id="119" name="Content Placeholder 2"/>
+          <p:cNvPr id="122" name="Content Placeholder 2"/>
+          <p:cNvSpPr txBox="1"/>
+          <p:nvPr>
+            <p:ph type="body" sz="quarter" idx="1"/>
+          </p:nvPr>
+        </p:nvSpPr>
+        <p:spPr>
+          <a:xfrm>
+            <a:off x="457200" y="1600200"/>
+            <a:ext cx="8229600" cy="1305372"/>
+          </a:xfrm>
+          <a:prstGeom prst="rect">
+            <a:avLst/>
+          </a:prstGeom>
+        </p:spPr>
+        <p:txBody>
+          <a:bodyPr/>
+          <a:lstStyle/>
+          <a:p>
+            <a:pPr marL="120315" indent="-120315">
+              <a:buFontTx/>
+              <a:defRPr sz="1200">
+                <a:latin typeface="Times New Roman"/>
+                <a:ea typeface="Times New Roman"/>
+                <a:cs typeface="Times New Roman"/>
+                <a:sym typeface="Times New Roman"/>
+              </a:defRPr>
+            </a:pPr>
+            <a:r>
+              <a:t>Top users by number of messages sent</a:t>
+            </a:r>
+          </a:p>
+          <a:p>
+            <a:pPr marL="120315" indent="-120315">
+              <a:buFontTx/>
+              <a:defRPr sz="1200">
+                <a:latin typeface="Times New Roman"/>
+                <a:ea typeface="Times New Roman"/>
+                <a:cs typeface="Times New Roman"/>
+                <a:sym typeface="Times New Roman"/>
+              </a:defRPr>
+            </a:pPr>
+            <a:r>
+              <a:t>Most active conversations</a:t>
+            </a:r>
+          </a:p>
+          <a:p>
+            <a:pPr marL="120315" indent="-120315">
+              <a:buFontTx/>
+              <a:defRPr sz="1200">
+                <a:latin typeface="Times New Roman"/>
+                <a:ea typeface="Times New Roman"/>
+                <a:cs typeface="Times New Roman"/>
+                <a:sym typeface="Times New Roman"/>
+              </a:defRPr>
+            </a:pPr>
+            <a:r>
+              <a:t>Reaction type distribution</a:t>
+            </a:r>
+          </a:p>
+          <a:p>
+            <a:pPr marL="120315" indent="-120315">
+              <a:buFontTx/>
+              <a:defRPr sz="1200">
+                <a:latin typeface="Times New Roman"/>
+                <a:ea typeface="Times New Roman"/>
+                <a:cs typeface="Times New Roman"/>
+                <a:sym typeface="Times New Roman"/>
+              </a:defRPr>
+            </a:pPr>
+            <a:r>
+              <a:t>Aggregation pipelines and outputs documented in </a:t>
+            </a:r>
+            <a:r>
+              <a:rPr>
+                <a:solidFill>
+                  <a:schemeClr val="accent1">
+                    <a:satOff val="-4409"/>
+                    <a:lumOff val="-10509"/>
+                  </a:schemeClr>
+                </a:solidFill>
+              </a:rPr>
+              <a:t>aggregations.md</a:t>
+            </a:r>
+          </a:p>
+        </p:txBody>
+      </p:sp>
+      <p:sp>
+        <p:nvSpPr>
+          <p:cNvPr id="123" name="Title 1"/>
+          <p:cNvSpPr txBox="1"/>
+          <p:nvPr/>
+        </p:nvSpPr>
+        <p:spPr>
+          <a:xfrm>
+            <a:off x="457200" y="3088133"/>
+            <a:ext cx="8229600" cy="1143001"/>
+          </a:xfrm>
+          <a:prstGeom prst="rect">
+            <a:avLst/>
+          </a:prstGeom>
+          <a:ln w="12700">
+            <a:miter lim="400000"/>
+          </a:ln>
+          <a:extLst>
+            <a:ext uri="{C572A759-6A51-4108-AA02-DFA0A04FC94B}">
+              <ma14:wrappingTextBoxFlag xmlns:ma14="http://schemas.microsoft.com/office/mac/drawingml/2011/main" val="1"/>
+            </a:ext>
+          </a:extLst>
+        </p:spPr>
+        <p:txBody>
+          <a:bodyPr lIns="45719" rIns="45719" anchor="ctr">
+            <a:normAutofit fontScale="100000" lnSpcReduction="0"/>
+          </a:bodyPr>
+          <a:lstStyle>
+            <a:lvl1pPr algn="ctr">
+              <a:defRPr b="1">
+                <a:latin typeface="Times New Roman"/>
+                <a:ea typeface="Times New Roman"/>
+                <a:cs typeface="Times New Roman"/>
+                <a:sym typeface="Times New Roman"/>
+              </a:defRPr>
+            </a:lvl1pPr>
+          </a:lstStyle>
+          <a:p>
+            <a:pPr/>
+            <a:r>
+              <a:t>Scaling Strategies in MongoDB</a:t>
+            </a:r>
+          </a:p>
+        </p:txBody>
+      </p:sp>
+      <p:sp>
+        <p:nvSpPr>
+          <p:cNvPr id="124" name="Content Placeholder 2"/>
+          <p:cNvSpPr txBox="1"/>
+          <p:nvPr/>
+        </p:nvSpPr>
+        <p:spPr>
+          <a:xfrm>
+            <a:off x="457200" y="4413696"/>
+            <a:ext cx="8229600" cy="1821707"/>
+          </a:xfrm>
+          <a:prstGeom prst="rect">
+            <a:avLst/>
+          </a:prstGeom>
+          <a:ln w="12700">
+            <a:miter lim="400000"/>
+          </a:ln>
+          <a:extLst>
+            <a:ext uri="{C572A759-6A51-4108-AA02-DFA0A04FC94B}">
+              <ma14:wrappingTextBoxFlag xmlns:ma14="http://schemas.microsoft.com/office/mac/drawingml/2011/main" val="1"/>
+            </a:ext>
+          </a:extLst>
+        </p:spPr>
+        <p:txBody>
+          <a:bodyPr lIns="45719" rIns="45719">
+            <a:normAutofit fontScale="100000" lnSpcReduction="0"/>
+          </a:bodyPr>
+          <a:lstStyle/>
+          <a:p>
+            <a:pPr marL="120315" indent="-120315">
+              <a:spcBef>
+                <a:spcPts val="700"/>
+              </a:spcBef>
+              <a:buSzPct val="100000"/>
+              <a:buChar char="•"/>
+              <a:defRPr sz="1200">
+                <a:latin typeface="Times New Roman"/>
+                <a:ea typeface="Times New Roman"/>
+                <a:cs typeface="Times New Roman"/>
+                <a:sym typeface="Times New Roman"/>
+              </a:defRPr>
+            </a:pPr>
+            <a:r>
+              <a:t>Indexing: demonstrated via query execution plans</a:t>
+            </a:r>
+          </a:p>
+          <a:p>
+            <a:pPr marL="120315" indent="-120315">
+              <a:spcBef>
+                <a:spcPts val="700"/>
+              </a:spcBef>
+              <a:buSzPct val="100000"/>
+              <a:buChar char="•"/>
+              <a:defRPr sz="1200">
+                <a:latin typeface="Times New Roman"/>
+                <a:ea typeface="Times New Roman"/>
+                <a:cs typeface="Times New Roman"/>
+                <a:sym typeface="Times New Roman"/>
+              </a:defRPr>
+            </a:pPr>
+            <a:r>
+              <a:t>Replication: 3-node replica set with automatic failover</a:t>
+            </a:r>
+          </a:p>
+          <a:p>
+            <a:pPr marL="120315" indent="-120315">
+              <a:spcBef>
+                <a:spcPts val="700"/>
+              </a:spcBef>
+              <a:buSzPct val="100000"/>
+              <a:buChar char="•"/>
+              <a:defRPr sz="1200">
+                <a:latin typeface="Times New Roman"/>
+                <a:ea typeface="Times New Roman"/>
+                <a:cs typeface="Times New Roman"/>
+                <a:sym typeface="Times New Roman"/>
+              </a:defRPr>
+            </a:pPr>
+            <a:r>
+              <a:t>Reaction type distribution</a:t>
+            </a:r>
+          </a:p>
+          <a:p>
+            <a:pPr marL="120315" indent="-120315">
+              <a:spcBef>
+                <a:spcPts val="700"/>
+              </a:spcBef>
+              <a:buSzPct val="100000"/>
+              <a:buChar char="•"/>
+              <a:defRPr sz="1200">
+                <a:latin typeface="Times New Roman"/>
+                <a:ea typeface="Times New Roman"/>
+                <a:cs typeface="Times New Roman"/>
+                <a:sym typeface="Times New Roman"/>
+              </a:defRPr>
+            </a:pPr>
+            <a:r>
+              <a:t>Sharding: design plan and justification (not implemented)</a:t>
+            </a:r>
+          </a:p>
+          <a:p>
+            <a:pPr marL="120315" indent="-120315">
+              <a:spcBef>
+                <a:spcPts val="700"/>
+              </a:spcBef>
+              <a:buSzPct val="100000"/>
+              <a:buChar char="•"/>
+              <a:defRPr sz="1200">
+                <a:latin typeface="Times New Roman"/>
+                <a:ea typeface="Times New Roman"/>
+                <a:cs typeface="Times New Roman"/>
+                <a:sym typeface="Times New Roman"/>
+              </a:defRPr>
+            </a:pPr>
+            <a:r>
+              <a:t>Sharding was not implemented due to complexity and time constraints; a detailed design and justification are provided.</a:t>
+            </a:r>
+          </a:p>
+        </p:txBody>
+      </p:sp>
+    </p:spTree>
+  </p:cSld>
+  <p:clrMapOvr>
+    <a:masterClrMapping/>
+  </p:clrMapOvr>
+  <p:transition xmlns:p14="http://schemas.microsoft.com/office/powerpoint/2010/main" spd="med" advClick="1"/>
+</p:sld>
+</file>
+
+<file path=ppt/slides/slide8.xml><?xml version="1.0" encoding="utf-8"?>
+<p:sld xmlns:a="http://schemas.openxmlformats.org/drawingml/2006/main" xmlns:r="http://schemas.openxmlformats.org/officeDocument/2006/relationships" xmlns:p="http://schemas.openxmlformats.org/presentationml/2006/main" xmlns:m="http://schemas.openxmlformats.org/officeDocument/2006/math" xmlns:a14="http://schemas.microsoft.com/office/drawing/2010/main" showMasterSp="1" showMasterPhAnim="1">
+  <p:cSld>
+    <p:spTree>
+      <p:nvGrpSpPr>
+        <p:cNvPr id="1" name=""/>
+        <p:cNvGrpSpPr/>
+        <p:nvPr/>
+      </p:nvGrpSpPr>
+      <p:grpSpPr>
+        <a:xfrm>
+          <a:off x="0" y="0"/>
+          <a:ext cx="0" cy="0"/>
+          <a:chOff x="0" y="0"/>
+          <a:chExt cx="0" cy="0"/>
+        </a:xfrm>
+      </p:grpSpPr>
+      <p:sp>
+        <p:nvSpPr>
+          <p:cNvPr id="126" name="Title 1"/>
+          <p:cNvSpPr txBox="1"/>
+          <p:nvPr>
+            <p:ph type="title"/>
+          </p:nvPr>
+        </p:nvSpPr>
+        <p:spPr>
+          <a:prstGeom prst="rect">
+            <a:avLst/>
+          </a:prstGeom>
+        </p:spPr>
+        <p:txBody>
+          <a:bodyPr/>
+          <a:lstStyle>
+            <a:lvl1pPr>
+              <a:defRPr b="1" sz="1800">
+                <a:latin typeface="Times New Roman"/>
+                <a:ea typeface="Times New Roman"/>
+                <a:cs typeface="Times New Roman"/>
+                <a:sym typeface="Times New Roman"/>
+              </a:defRPr>
+            </a:lvl1pPr>
+          </a:lstStyle>
+          <a:p>
+            <a:pPr/>
+            <a:r>
+              <a:t>Conclusion</a:t>
+            </a:r>
+          </a:p>
+        </p:txBody>
+      </p:sp>
+      <p:sp>
+        <p:nvSpPr>
+          <p:cNvPr id="127" name="Content Placeholder 2"/>
           <p:cNvSpPr txBox="1"/>
           <p:nvPr>
             <p:ph type="body" idx="1"/>

</xml_diff>